<commit_message>
Some updates on readme
</commit_message>
<xml_diff>
--- a/terraform_test_AWS/SecretManager/images/architecture.pptx
+++ b/terraform_test_AWS/SecretManager/images/architecture.pptx
@@ -3347,6 +3347,148 @@
           <a:chExt cx="0" cy="0"/>
         </a:xfrm>
       </p:grpSpPr>
+      <p:cxnSp>
+        <p:nvCxnSpPr>
+          <p:cNvPr id="31" name="Elbow Connector 30">
+            <a:extLst>
+              <a:ext uri="{FF2B5EF4-FFF2-40B4-BE49-F238E27FC236}">
+                <a16:creationId xmlns:a16="http://schemas.microsoft.com/office/drawing/2014/main" id="{17BC1CB3-AC22-904F-82B3-9B5D0163F138}"/>
+              </a:ext>
+            </a:extLst>
+          </p:cNvPr>
+          <p:cNvCxnSpPr>
+            <a:cxnSpLocks/>
+          </p:cNvCxnSpPr>
+          <p:nvPr/>
+        </p:nvCxnSpPr>
+        <p:spPr>
+          <a:xfrm rot="10800000" flipH="1" flipV="1">
+            <a:off x="9240500" y="3606963"/>
+            <a:ext cx="360000" cy="1667182"/>
+          </a:xfrm>
+          <a:prstGeom prst="bentConnector2">
+            <a:avLst/>
+          </a:prstGeom>
+          <a:ln w="12700">
+            <a:solidFill>
+              <a:schemeClr val="tx1">
+                <a:lumMod val="50000"/>
+                <a:lumOff val="50000"/>
+              </a:schemeClr>
+            </a:solidFill>
+            <a:headEnd type="triangle"/>
+          </a:ln>
+        </p:spPr>
+        <p:style>
+          <a:lnRef idx="1">
+            <a:schemeClr val="accent1"/>
+          </a:lnRef>
+          <a:fillRef idx="0">
+            <a:schemeClr val="accent1"/>
+          </a:fillRef>
+          <a:effectRef idx="0">
+            <a:schemeClr val="accent1"/>
+          </a:effectRef>
+          <a:fontRef idx="minor">
+            <a:schemeClr val="tx1"/>
+          </a:fontRef>
+        </p:style>
+      </p:cxnSp>
+      <p:cxnSp>
+        <p:nvCxnSpPr>
+          <p:cNvPr id="34" name="Straight Arrow Connector 33">
+            <a:extLst>
+              <a:ext uri="{FF2B5EF4-FFF2-40B4-BE49-F238E27FC236}">
+                <a16:creationId xmlns:a16="http://schemas.microsoft.com/office/drawing/2014/main" id="{265CC519-6555-FE47-99D7-29B5971FA514}"/>
+              </a:ext>
+            </a:extLst>
+          </p:cNvPr>
+          <p:cNvCxnSpPr>
+            <a:cxnSpLocks/>
+          </p:cNvCxnSpPr>
+          <p:nvPr/>
+        </p:nvCxnSpPr>
+        <p:spPr>
+          <a:xfrm flipH="1">
+            <a:off x="5900135" y="2985232"/>
+            <a:ext cx="1080000" cy="0"/>
+          </a:xfrm>
+          <a:prstGeom prst="straightConnector1">
+            <a:avLst/>
+          </a:prstGeom>
+          <a:ln w="12700">
+            <a:solidFill>
+              <a:schemeClr val="tx1">
+                <a:lumMod val="50000"/>
+                <a:lumOff val="50000"/>
+              </a:schemeClr>
+            </a:solidFill>
+            <a:headEnd type="none"/>
+            <a:tailEnd type="triangle"/>
+          </a:ln>
+        </p:spPr>
+        <p:style>
+          <a:lnRef idx="1">
+            <a:schemeClr val="accent1"/>
+          </a:lnRef>
+          <a:fillRef idx="0">
+            <a:schemeClr val="accent1"/>
+          </a:fillRef>
+          <a:effectRef idx="0">
+            <a:schemeClr val="accent1"/>
+          </a:effectRef>
+          <a:fontRef idx="minor">
+            <a:schemeClr val="tx1"/>
+          </a:fontRef>
+        </p:style>
+      </p:cxnSp>
+      <p:cxnSp>
+        <p:nvCxnSpPr>
+          <p:cNvPr id="37" name="Straight Arrow Connector 36">
+            <a:extLst>
+              <a:ext uri="{FF2B5EF4-FFF2-40B4-BE49-F238E27FC236}">
+                <a16:creationId xmlns:a16="http://schemas.microsoft.com/office/drawing/2014/main" id="{1940E6CD-7956-9D42-8D24-686681E19D7E}"/>
+              </a:ext>
+            </a:extLst>
+          </p:cNvPr>
+          <p:cNvCxnSpPr>
+            <a:cxnSpLocks/>
+          </p:cNvCxnSpPr>
+          <p:nvPr/>
+        </p:nvCxnSpPr>
+        <p:spPr>
+          <a:xfrm>
+            <a:off x="6985739" y="2985232"/>
+            <a:ext cx="2434761" cy="2288914"/>
+          </a:xfrm>
+          <a:prstGeom prst="straightConnector1">
+            <a:avLst/>
+          </a:prstGeom>
+          <a:ln w="12700">
+            <a:solidFill>
+              <a:schemeClr val="tx1">
+                <a:lumMod val="50000"/>
+                <a:lumOff val="50000"/>
+              </a:schemeClr>
+            </a:solidFill>
+            <a:tailEnd type="none"/>
+          </a:ln>
+        </p:spPr>
+        <p:style>
+          <a:lnRef idx="1">
+            <a:schemeClr val="accent1"/>
+          </a:lnRef>
+          <a:fillRef idx="0">
+            <a:schemeClr val="accent1"/>
+          </a:fillRef>
+          <a:effectRef idx="0">
+            <a:schemeClr val="accent1"/>
+          </a:effectRef>
+          <a:fontRef idx="minor">
+            <a:schemeClr val="tx1"/>
+          </a:fontRef>
+        </p:style>
+      </p:cxnSp>
       <p:sp>
         <p:nvSpPr>
           <p:cNvPr id="4" name="Rectangle 3">
@@ -4328,7 +4470,7 @@
         </p:nvSpPr>
         <p:spPr>
           <a:xfrm>
-            <a:off x="7345551" y="5387273"/>
+            <a:off x="5228541" y="5504221"/>
             <a:ext cx="1390124" cy="461665"/>
           </a:xfrm>
           <a:prstGeom prst="rect">
@@ -4342,6 +4484,7 @@
           </a:bodyPr>
           <a:lstStyle/>
           <a:p>
+            <a:pPr algn="r"/>
             <a:r>
               <a:rPr lang="en-IT" sz="1200" b="1" i="1" dirty="0">
                 <a:latin typeface="IBM Plex Sans Condensed" panose="020B0506050203000203" pitchFamily="34" charset="77"/>
@@ -4350,6 +4493,7 @@
             </a:r>
           </a:p>
           <a:p>
+            <a:pPr algn="r"/>
             <a:r>
               <a:rPr lang="en-GB" sz="1200" i="1" dirty="0">
                 <a:latin typeface="IBM Plex Sans Condensed" panose="020B0506050203000203" pitchFamily="34" charset="77"/>
@@ -4591,6 +4735,133 @@
           </a:prstGeom>
         </p:spPr>
       </p:pic>
+      <p:pic>
+        <p:nvPicPr>
+          <p:cNvPr id="2" name="Picture 2" descr="varunchandak (Varun Chandak) · GitHub">
+            <a:extLst>
+              <a:ext uri="{FF2B5EF4-FFF2-40B4-BE49-F238E27FC236}">
+                <a16:creationId xmlns:a16="http://schemas.microsoft.com/office/drawing/2014/main" id="{3A3A440E-CEC0-D54A-AE6B-3FB393740196}"/>
+              </a:ext>
+            </a:extLst>
+          </p:cNvPr>
+          <p:cNvPicPr>
+            <a:picLocks noChangeAspect="1" noChangeArrowheads="1"/>
+          </p:cNvPicPr>
+          <p:nvPr/>
+        </p:nvPicPr>
+        <p:blipFill>
+          <a:blip r:embed="rId18">
+            <a:extLst>
+              <a:ext uri="{28A0092B-C50C-407E-A947-70E740481C1C}">
+                <a14:useLocalDpi xmlns:a14="http://schemas.microsoft.com/office/drawing/2010/main" val="0"/>
+              </a:ext>
+            </a:extLst>
+          </a:blip>
+          <a:srcRect/>
+          <a:stretch>
+            <a:fillRect/>
+          </a:stretch>
+        </p:blipFill>
+        <p:spPr bwMode="auto">
+          <a:xfrm>
+            <a:off x="9256598" y="5276670"/>
+            <a:ext cx="682870" cy="682870"/>
+          </a:xfrm>
+          <a:prstGeom prst="rect">
+            <a:avLst/>
+          </a:prstGeom>
+          <a:noFill/>
+          <a:extLst>
+            <a:ext uri="{909E8E84-426E-40DD-AFC4-6F175D3DCCD1}">
+              <a14:hiddenFill xmlns:a14="http://schemas.microsoft.com/office/drawing/2010/main">
+                <a:solidFill>
+                  <a:srgbClr val="FFFFFF"/>
+                </a:solidFill>
+              </a14:hiddenFill>
+            </a:ext>
+          </a:extLst>
+        </p:spPr>
+      </p:pic>
+      <p:sp>
+        <p:nvSpPr>
+          <p:cNvPr id="39" name="TextBox 38">
+            <a:extLst>
+              <a:ext uri="{FF2B5EF4-FFF2-40B4-BE49-F238E27FC236}">
+                <a16:creationId xmlns:a16="http://schemas.microsoft.com/office/drawing/2014/main" id="{35A70FFC-1841-194C-8D2C-099FA74C01FA}"/>
+              </a:ext>
+            </a:extLst>
+          </p:cNvPr>
+          <p:cNvSpPr txBox="1"/>
+          <p:nvPr/>
+        </p:nvSpPr>
+        <p:spPr>
+          <a:xfrm>
+            <a:off x="7964680" y="5497875"/>
+            <a:ext cx="1199367" cy="461665"/>
+          </a:xfrm>
+          <a:prstGeom prst="rect">
+            <a:avLst/>
+          </a:prstGeom>
+          <a:noFill/>
+        </p:spPr>
+        <p:txBody>
+          <a:bodyPr wrap="none" rtlCol="0">
+            <a:spAutoFit/>
+          </a:bodyPr>
+          <a:lstStyle/>
+          <a:p>
+            <a:pPr algn="r"/>
+            <a:r>
+              <a:rPr lang="en-IT" sz="1200" b="1" i="1" dirty="0">
+                <a:latin typeface="IBM Plex Sans Condensed" panose="020B0506050203000203" pitchFamily="34" charset="77"/>
+              </a:rPr>
+              <a:t>SecretManager</a:t>
+            </a:r>
+          </a:p>
+          <a:p>
+            <a:pPr algn="r"/>
+            <a:r>
+              <a:rPr lang="it-IT" sz="1200" i="1" dirty="0">
+                <a:latin typeface="IBM Plex Sans Condensed" panose="020B0506050203000203" pitchFamily="34" charset="77"/>
+              </a:rPr>
+              <a:t>For </a:t>
+            </a:r>
+            <a:r>
+              <a:rPr lang="it-IT" sz="1200" i="1" dirty="0" err="1">
+                <a:latin typeface="IBM Plex Sans Condensed" panose="020B0506050203000203" pitchFamily="34" charset="77"/>
+              </a:rPr>
+              <a:t>db</a:t>
+            </a:r>
+            <a:r>
+              <a:rPr lang="it-IT" sz="1200" i="1" dirty="0">
+                <a:latin typeface="IBM Plex Sans Condensed" panose="020B0506050203000203" pitchFamily="34" charset="77"/>
+              </a:rPr>
+              <a:t> </a:t>
+            </a:r>
+            <a:r>
+              <a:rPr lang="it-IT" sz="1200" i="1" dirty="0" err="1">
+                <a:latin typeface="IBM Plex Sans Condensed" panose="020B0506050203000203" pitchFamily="34" charset="77"/>
+              </a:rPr>
+              <a:t>user</a:t>
+            </a:r>
+            <a:r>
+              <a:rPr lang="it-IT" sz="1200" i="1" dirty="0">
+                <a:latin typeface="IBM Plex Sans Condensed" panose="020B0506050203000203" pitchFamily="34" charset="77"/>
+              </a:rPr>
+              <a:t>/</a:t>
+            </a:r>
+            <a:r>
+              <a:rPr lang="it-IT" sz="1200" i="1" dirty="0" err="1">
+                <a:latin typeface="IBM Plex Sans Condensed" panose="020B0506050203000203" pitchFamily="34" charset="77"/>
+              </a:rPr>
+              <a:t>pwd</a:t>
+            </a:r>
+            <a:endParaRPr lang="en-IT" sz="1200" i="1" dirty="0">
+              <a:latin typeface="IBM Plex Sans Condensed" panose="020B0506050203000203" pitchFamily="34" charset="77"/>
+            </a:endParaRPr>
+          </a:p>
+        </p:txBody>
+      </p:sp>
     </p:spTree>
     <p:extLst>
       <p:ext uri="{BB962C8B-B14F-4D97-AF65-F5344CB8AC3E}">

</xml_diff>

<commit_message>
updated images and architecture file
</commit_message>
<xml_diff>
--- a/terraform_test_AWS/SecretManager/images/architecture.pptx
+++ b/terraform_test_AWS/SecretManager/images/architecture.pptx
@@ -261,7 +261,7 @@
           <a:p>
             <a:fld id="{038AA72E-CE08-9B48-AD11-F05CDD148325}" type="datetimeFigureOut">
               <a:rPr lang="en-IT" smtClean="0"/>
-              <a:t>06/11/2020</a:t>
+              <a:t>08/11/2020</a:t>
             </a:fld>
             <a:endParaRPr lang="en-IT"/>
           </a:p>
@@ -461,7 +461,7 @@
           <a:p>
             <a:fld id="{038AA72E-CE08-9B48-AD11-F05CDD148325}" type="datetimeFigureOut">
               <a:rPr lang="en-IT" smtClean="0"/>
-              <a:t>06/11/2020</a:t>
+              <a:t>08/11/2020</a:t>
             </a:fld>
             <a:endParaRPr lang="en-IT"/>
           </a:p>
@@ -671,7 +671,7 @@
           <a:p>
             <a:fld id="{038AA72E-CE08-9B48-AD11-F05CDD148325}" type="datetimeFigureOut">
               <a:rPr lang="en-IT" smtClean="0"/>
-              <a:t>06/11/2020</a:t>
+              <a:t>08/11/2020</a:t>
             </a:fld>
             <a:endParaRPr lang="en-IT"/>
           </a:p>
@@ -871,7 +871,7 @@
           <a:p>
             <a:fld id="{038AA72E-CE08-9B48-AD11-F05CDD148325}" type="datetimeFigureOut">
               <a:rPr lang="en-IT" smtClean="0"/>
-              <a:t>06/11/2020</a:t>
+              <a:t>08/11/2020</a:t>
             </a:fld>
             <a:endParaRPr lang="en-IT"/>
           </a:p>
@@ -1147,7 +1147,7 @@
           <a:p>
             <a:fld id="{038AA72E-CE08-9B48-AD11-F05CDD148325}" type="datetimeFigureOut">
               <a:rPr lang="en-IT" smtClean="0"/>
-              <a:t>06/11/2020</a:t>
+              <a:t>08/11/2020</a:t>
             </a:fld>
             <a:endParaRPr lang="en-IT"/>
           </a:p>
@@ -1415,7 +1415,7 @@
           <a:p>
             <a:fld id="{038AA72E-CE08-9B48-AD11-F05CDD148325}" type="datetimeFigureOut">
               <a:rPr lang="en-IT" smtClean="0"/>
-              <a:t>06/11/2020</a:t>
+              <a:t>08/11/2020</a:t>
             </a:fld>
             <a:endParaRPr lang="en-IT"/>
           </a:p>
@@ -1830,7 +1830,7 @@
           <a:p>
             <a:fld id="{038AA72E-CE08-9B48-AD11-F05CDD148325}" type="datetimeFigureOut">
               <a:rPr lang="en-IT" smtClean="0"/>
-              <a:t>06/11/2020</a:t>
+              <a:t>08/11/2020</a:t>
             </a:fld>
             <a:endParaRPr lang="en-IT"/>
           </a:p>
@@ -1972,7 +1972,7 @@
           <a:p>
             <a:fld id="{038AA72E-CE08-9B48-AD11-F05CDD148325}" type="datetimeFigureOut">
               <a:rPr lang="en-IT" smtClean="0"/>
-              <a:t>06/11/2020</a:t>
+              <a:t>08/11/2020</a:t>
             </a:fld>
             <a:endParaRPr lang="en-IT"/>
           </a:p>
@@ -2085,7 +2085,7 @@
           <a:p>
             <a:fld id="{038AA72E-CE08-9B48-AD11-F05CDD148325}" type="datetimeFigureOut">
               <a:rPr lang="en-IT" smtClean="0"/>
-              <a:t>06/11/2020</a:t>
+              <a:t>08/11/2020</a:t>
             </a:fld>
             <a:endParaRPr lang="en-IT"/>
           </a:p>
@@ -2398,7 +2398,7 @@
           <a:p>
             <a:fld id="{038AA72E-CE08-9B48-AD11-F05CDD148325}" type="datetimeFigureOut">
               <a:rPr lang="en-IT" smtClean="0"/>
-              <a:t>06/11/2020</a:t>
+              <a:t>08/11/2020</a:t>
             </a:fld>
             <a:endParaRPr lang="en-IT"/>
           </a:p>
@@ -2687,7 +2687,7 @@
           <a:p>
             <a:fld id="{038AA72E-CE08-9B48-AD11-F05CDD148325}" type="datetimeFigureOut">
               <a:rPr lang="en-IT" smtClean="0"/>
-              <a:t>06/11/2020</a:t>
+              <a:t>08/11/2020</a:t>
             </a:fld>
             <a:endParaRPr lang="en-IT"/>
           </a:p>
@@ -2930,7 +2930,7 @@
           <a:p>
             <a:fld id="{038AA72E-CE08-9B48-AD11-F05CDD148325}" type="datetimeFigureOut">
               <a:rPr lang="en-IT" smtClean="0"/>
-              <a:t>06/11/2020</a:t>
+              <a:t>08/11/2020</a:t>
             </a:fld>
             <a:endParaRPr lang="en-IT"/>
           </a:p>
@@ -3349,6 +3349,55 @@
       </p:grpSpPr>
       <p:cxnSp>
         <p:nvCxnSpPr>
+          <p:cNvPr id="46" name="Straight Arrow Connector 45">
+            <a:extLst>
+              <a:ext uri="{FF2B5EF4-FFF2-40B4-BE49-F238E27FC236}">
+                <a16:creationId xmlns:a16="http://schemas.microsoft.com/office/drawing/2014/main" id="{024A6CFC-C253-D343-AD31-B0321A2F6CA0}"/>
+              </a:ext>
+            </a:extLst>
+          </p:cNvPr>
+          <p:cNvCxnSpPr>
+            <a:cxnSpLocks/>
+          </p:cNvCxnSpPr>
+          <p:nvPr/>
+        </p:nvCxnSpPr>
+        <p:spPr>
+          <a:xfrm flipV="1">
+            <a:off x="5180049" y="4196843"/>
+            <a:ext cx="0" cy="1116000"/>
+          </a:xfrm>
+          <a:prstGeom prst="straightConnector1">
+            <a:avLst/>
+          </a:prstGeom>
+          <a:ln w="12700">
+            <a:solidFill>
+              <a:schemeClr val="tx1">
+                <a:lumMod val="50000"/>
+                <a:lumOff val="50000"/>
+              </a:schemeClr>
+            </a:solidFill>
+            <a:prstDash val="sysDot"/>
+            <a:headEnd type="none"/>
+            <a:tailEnd type="triangle"/>
+          </a:ln>
+        </p:spPr>
+        <p:style>
+          <a:lnRef idx="1">
+            <a:schemeClr val="accent1"/>
+          </a:lnRef>
+          <a:fillRef idx="0">
+            <a:schemeClr val="accent1"/>
+          </a:fillRef>
+          <a:effectRef idx="0">
+            <a:schemeClr val="accent1"/>
+          </a:effectRef>
+          <a:fontRef idx="minor">
+            <a:schemeClr val="tx1"/>
+          </a:fontRef>
+        </p:style>
+      </p:cxnSp>
+      <p:cxnSp>
+        <p:nvCxnSpPr>
           <p:cNvPr id="31" name="Elbow Connector 30">
             <a:extLst>
               <a:ext uri="{FF2B5EF4-FFF2-40B4-BE49-F238E27FC236}">
@@ -3376,6 +3425,7 @@
                 <a:lumOff val="50000"/>
               </a:schemeClr>
             </a:solidFill>
+            <a:prstDash val="sysDot"/>
             <a:headEnd type="triangle"/>
           </a:ln>
         </p:spPr>
@@ -3423,6 +3473,7 @@
                 <a:lumOff val="50000"/>
               </a:schemeClr>
             </a:solidFill>
+            <a:prstDash val="sysDot"/>
             <a:headEnd type="none"/>
             <a:tailEnd type="triangle"/>
           </a:ln>
@@ -3471,7 +3522,8 @@
                 <a:lumOff val="50000"/>
               </a:schemeClr>
             </a:solidFill>
-            <a:tailEnd type="none"/>
+            <a:prstDash val="sysDot"/>
+            <a:tailEnd type="triangle"/>
           </a:ln>
         </p:spPr>
         <p:style>
@@ -3817,8 +3869,8 @@
         </p:nvSpPr>
         <p:spPr>
           <a:xfrm>
-            <a:off x="3357563" y="1343029"/>
-            <a:ext cx="7032616" cy="4800594"/>
+            <a:off x="3357563" y="1343028"/>
+            <a:ext cx="7032616" cy="4929181"/>
           </a:xfrm>
           <a:prstGeom prst="roundRect">
             <a:avLst>
@@ -4360,7 +4412,7 @@
         </p:blipFill>
         <p:spPr>
           <a:xfrm>
-            <a:off x="6677131" y="5339172"/>
+            <a:off x="6705707" y="5339172"/>
             <a:ext cx="596980" cy="723086"/>
           </a:xfrm>
           <a:prstGeom prst="rect">
@@ -4470,8 +4522,8 @@
         </p:nvSpPr>
         <p:spPr>
           <a:xfrm>
-            <a:off x="5228541" y="5504221"/>
-            <a:ext cx="1390124" cy="461665"/>
+            <a:off x="5622215" y="5332765"/>
+            <a:ext cx="996449" cy="646331"/>
           </a:xfrm>
           <a:prstGeom prst="rect">
             <a:avLst/>
@@ -4479,7 +4531,7 @@
           <a:noFill/>
         </p:spPr>
         <p:txBody>
-          <a:bodyPr wrap="none" rtlCol="0">
+          <a:bodyPr wrap="square" rtlCol="0">
             <a:spAutoFit/>
           </a:bodyPr>
           <a:lstStyle/>
@@ -4796,8 +4848,8 @@
         </p:nvSpPr>
         <p:spPr>
           <a:xfrm>
-            <a:off x="7964680" y="5497875"/>
-            <a:ext cx="1199367" cy="461665"/>
+            <a:off x="7945380" y="5332765"/>
+            <a:ext cx="1218667" cy="830997"/>
           </a:xfrm>
           <a:prstGeom prst="rect">
             <a:avLst/>
@@ -4815,7 +4867,7 @@
               <a:rPr lang="en-IT" sz="1200" b="1" i="1" dirty="0">
                 <a:latin typeface="IBM Plex Sans Condensed" panose="020B0506050203000203" pitchFamily="34" charset="77"/>
               </a:rPr>
-              <a:t>SecretManager</a:t>
+              <a:t>SecretsManager</a:t>
             </a:r>
           </a:p>
           <a:p>
@@ -4824,8 +4876,20 @@
               <a:rPr lang="it-IT" sz="1200" i="1" dirty="0">
                 <a:latin typeface="IBM Plex Sans Condensed" panose="020B0506050203000203" pitchFamily="34" charset="77"/>
               </a:rPr>
-              <a:t>For </a:t>
-            </a:r>
+              <a:t>User</a:t>
+            </a:r>
+          </a:p>
+          <a:p>
+            <a:pPr algn="r"/>
+            <a:r>
+              <a:rPr lang="it-IT" sz="1200" i="1" dirty="0">
+                <a:latin typeface="IBM Plex Sans Condensed" panose="020B0506050203000203" pitchFamily="34" charset="77"/>
+              </a:rPr>
+              <a:t>Password</a:t>
+            </a:r>
+          </a:p>
+          <a:p>
+            <a:pPr algn="r"/>
             <a:r>
               <a:rPr lang="it-IT" sz="1200" i="1" dirty="0" err="1">
                 <a:latin typeface="IBM Plex Sans Condensed" panose="020B0506050203000203" pitchFamily="34" charset="77"/>
@@ -4836,25 +4900,134 @@
               <a:rPr lang="it-IT" sz="1200" i="1" dirty="0">
                 <a:latin typeface="IBM Plex Sans Condensed" panose="020B0506050203000203" pitchFamily="34" charset="77"/>
               </a:rPr>
-              <a:t> </a:t>
-            </a:r>
+              <a:t> domain</a:t>
+            </a:r>
+            <a:endParaRPr lang="en-IT" sz="1200" i="1" dirty="0">
+              <a:latin typeface="IBM Plex Sans Condensed" panose="020B0506050203000203" pitchFamily="34" charset="77"/>
+            </a:endParaRPr>
+          </a:p>
+        </p:txBody>
+      </p:sp>
+      <p:pic>
+        <p:nvPicPr>
+          <p:cNvPr id="6" name="Picture 2" descr="IAM Role | AWS Security Identity &amp; Compliance">
+            <a:extLst>
+              <a:ext uri="{FF2B5EF4-FFF2-40B4-BE49-F238E27FC236}">
+                <a16:creationId xmlns:a16="http://schemas.microsoft.com/office/drawing/2014/main" id="{AA42BF06-4D4D-AA45-83AF-2ADE3D100063}"/>
+              </a:ext>
+            </a:extLst>
+          </p:cNvPr>
+          <p:cNvPicPr>
+            <a:picLocks noChangeAspect="1" noChangeArrowheads="1"/>
+          </p:cNvPicPr>
+          <p:nvPr/>
+        </p:nvPicPr>
+        <p:blipFill>
+          <a:blip r:embed="rId19">
+            <a:extLst>
+              <a:ext uri="{28A0092B-C50C-407E-A947-70E740481C1C}">
+                <a14:useLocalDpi xmlns:a14="http://schemas.microsoft.com/office/drawing/2010/main" val="0"/>
+              </a:ext>
+            </a:extLst>
+          </a:blip>
+          <a:srcRect/>
+          <a:stretch>
+            <a:fillRect/>
+          </a:stretch>
+        </p:blipFill>
+        <p:spPr bwMode="auto">
+          <a:xfrm>
+            <a:off x="4900958" y="5376014"/>
+            <a:ext cx="540000" cy="540000"/>
+          </a:xfrm>
+          <a:prstGeom prst="rect">
+            <a:avLst/>
+          </a:prstGeom>
+          <a:noFill/>
+          <a:extLst>
+            <a:ext uri="{909E8E84-426E-40DD-AFC4-6F175D3DCCD1}">
+              <a14:hiddenFill xmlns:a14="http://schemas.microsoft.com/office/drawing/2010/main">
+                <a:solidFill>
+                  <a:srgbClr val="FFFFFF"/>
+                </a:solidFill>
+              </a14:hiddenFill>
+            </a:ext>
+          </a:extLst>
+        </p:spPr>
+      </p:pic>
+      <p:sp>
+        <p:nvSpPr>
+          <p:cNvPr id="44" name="TextBox 43">
+            <a:extLst>
+              <a:ext uri="{FF2B5EF4-FFF2-40B4-BE49-F238E27FC236}">
+                <a16:creationId xmlns:a16="http://schemas.microsoft.com/office/drawing/2014/main" id="{F58757AE-94EE-7D4D-9DBB-A5C0E3666E78}"/>
+              </a:ext>
+            </a:extLst>
+          </p:cNvPr>
+          <p:cNvSpPr txBox="1"/>
+          <p:nvPr/>
+        </p:nvSpPr>
+        <p:spPr>
+          <a:xfrm>
+            <a:off x="3625459" y="5332765"/>
+            <a:ext cx="1201016" cy="646331"/>
+          </a:xfrm>
+          <a:prstGeom prst="rect">
+            <a:avLst/>
+          </a:prstGeom>
+          <a:noFill/>
+        </p:spPr>
+        <p:txBody>
+          <a:bodyPr wrap="square" rtlCol="0">
+            <a:spAutoFit/>
+          </a:bodyPr>
+          <a:lstStyle/>
+          <a:p>
+            <a:pPr algn="r"/>
+            <a:r>
+              <a:rPr lang="en-IT" sz="1200" b="1" i="1" dirty="0">
+                <a:latin typeface="IBM Plex Sans Condensed" panose="020B0506050203000203" pitchFamily="34" charset="77"/>
+              </a:rPr>
+              <a:t>IAM Role</a:t>
+            </a:r>
+          </a:p>
+          <a:p>
+            <a:pPr algn="r"/>
             <a:r>
               <a:rPr lang="it-IT" sz="1200" i="1" dirty="0" err="1">
                 <a:latin typeface="IBM Plex Sans Condensed" panose="020B0506050203000203" pitchFamily="34" charset="77"/>
               </a:rPr>
-              <a:t>user</a:t>
+              <a:t>Let</a:t>
             </a:r>
             <a:r>
               <a:rPr lang="it-IT" sz="1200" i="1" dirty="0">
                 <a:latin typeface="IBM Plex Sans Condensed" panose="020B0506050203000203" pitchFamily="34" charset="77"/>
               </a:rPr>
-              <a:t>/</a:t>
+              <a:t> EC2 </a:t>
             </a:r>
             <a:r>
               <a:rPr lang="it-IT" sz="1200" i="1" dirty="0" err="1">
                 <a:latin typeface="IBM Plex Sans Condensed" panose="020B0506050203000203" pitchFamily="34" charset="77"/>
               </a:rPr>
-              <a:t>pwd</a:t>
+              <a:t>istance</a:t>
+            </a:r>
+            <a:r>
+              <a:rPr lang="it-IT" sz="1200" i="1" dirty="0">
+                <a:latin typeface="IBM Plex Sans Condensed" panose="020B0506050203000203" pitchFamily="34" charset="77"/>
+              </a:rPr>
+              <a:t> to </a:t>
+            </a:r>
+            <a:r>
+              <a:rPr lang="it-IT" sz="1200" i="1" dirty="0" err="1">
+                <a:latin typeface="IBM Plex Sans Condensed" panose="020B0506050203000203" pitchFamily="34" charset="77"/>
+              </a:rPr>
+              <a:t>read</a:t>
+            </a:r>
+            <a:r>
+              <a:rPr lang="it-IT" sz="1200" i="1" dirty="0">
+                <a:latin typeface="IBM Plex Sans Condensed" panose="020B0506050203000203" pitchFamily="34" charset="77"/>
+              </a:rPr>
+              <a:t> secret</a:t>
             </a:r>
             <a:endParaRPr lang="en-IT" sz="1200" i="1" dirty="0">
               <a:latin typeface="IBM Plex Sans Condensed" panose="020B0506050203000203" pitchFamily="34" charset="77"/>

</xml_diff>

<commit_message>
update readme and architecture image
</commit_message>
<xml_diff>
--- a/terraform_test_AWS/SecretManager/images/architecture.pptx
+++ b/terraform_test_AWS/SecretManager/images/architecture.pptx
@@ -4620,7 +4620,7 @@
         <p:spPr>
           <a:xfrm>
             <a:off x="5622216" y="4779100"/>
-            <a:ext cx="697627" cy="276999"/>
+            <a:ext cx="768159" cy="276999"/>
           </a:xfrm>
           <a:prstGeom prst="rect">
             <a:avLst/>
@@ -4637,7 +4637,7 @@
               <a:rPr lang="en-IT" sz="1200" b="1" i="1" dirty="0">
                 <a:latin typeface="IBM Plex Sans Condensed" panose="020B0506050203000203" pitchFamily="34" charset="77"/>
               </a:rPr>
-              <a:t>ElaticIP</a:t>
+              <a:t>ElasticIP</a:t>
             </a:r>
           </a:p>
         </p:txBody>

</xml_diff>